<commit_message>
Add prerequisites and copyright to slides.
</commit_message>
<xml_diff>
--- a/part1/Introduction-to-FMI.pptx
+++ b/part1/Introduction-to-FMI.pptx
@@ -444,7 +444,7 @@
               <a:pPr>
                 <a:defRPr/>
               </a:pPr>
-              <a:t>‹Nr.›</a:t>
+              <a:t>‹#›</a:t>
             </a:fld>
             <a:endParaRPr lang="de-DE" altLang="en-US"/>
           </a:p>
@@ -581,7 +581,7 @@
               <a:pPr>
                 <a:defRPr/>
               </a:pPr>
-              <a:t>6/23/2024</a:t>
+              <a:t>7/2/2024</a:t>
             </a:fld>
             <a:endParaRPr lang="en-US"/>
           </a:p>
@@ -789,7 +789,7 @@
               <a:pPr>
                 <a:defRPr/>
               </a:pPr>
-              <a:t>‹Nr.›</a:t>
+              <a:t>‹#›</a:t>
             </a:fld>
             <a:endParaRPr lang="en-US" altLang="en-US"/>
           </a:p>
@@ -2358,7 +2358,7 @@
             <a:fld id="{4898AEC0-503E-4FA4-859C-D0F72D6E3F79}" type="slidenum">
               <a:rPr lang="en-US" noProof="1" smtClean="0"/>
               <a:pPr/>
-              <a:t>‹Nr.›</a:t>
+              <a:t>‹#›</a:t>
             </a:fld>
             <a:endParaRPr lang="en-US" noProof="1"/>
           </a:p>
@@ -2951,7 +2951,7 @@
                 </a:spcBef>
                 <a:defRPr/>
               </a:pPr>
-              <a:t>‹Nr.›</a:t>
+              <a:t>‹#›</a:t>
             </a:fld>
             <a:endParaRPr lang="de-DE" altLang="en-US" sz="1000" dirty="0">
               <a:solidFill>
@@ -3675,7 +3675,7 @@
                 <a:latin typeface="+mn-lt"/>
                 <a:cs typeface="+mn-cs"/>
               </a:rPr>
-              <a:t>Presenters:</a:t>
+              <a:t>Contributors:</a:t>
             </a:r>
           </a:p>
           <a:p>
@@ -3694,6 +3694,16 @@
           <a:p>
             <a:pPr algn="ctr"/>
             <a:r>
+              <a:rPr lang="en-US" u="sng" dirty="0">
+                <a:solidFill>
+                  <a:srgbClr val="5E676E"/>
+                </a:solidFill>
+                <a:latin typeface="+mn-lt"/>
+                <a:cs typeface="+mn-cs"/>
+              </a:rPr>
+              <a:t>Christian Bertsch</a:t>
+            </a:r>
+            <a:r>
               <a:rPr lang="en-US" dirty="0">
                 <a:solidFill>
                   <a:srgbClr val="5E676E"/>
@@ -3701,11 +3711,21 @@
                 <a:latin typeface="+mn-lt"/>
                 <a:cs typeface="+mn-cs"/>
               </a:rPr>
-              <a:t>Christian Bertsch, Bosch Research</a:t>
+              <a:t>, Bosch Research</a:t>
             </a:r>
           </a:p>
           <a:p>
             <a:pPr algn="ctr"/>
+            <a:r>
+              <a:rPr lang="en-US" sz="1600" u="sng" dirty="0">
+                <a:solidFill>
+                  <a:srgbClr val="5E676E"/>
+                </a:solidFill>
+                <a:latin typeface="+mn-lt"/>
+                <a:cs typeface="+mn-cs"/>
+              </a:rPr>
+              <a:t>Claudio Gomes</a:t>
+            </a:r>
             <a:r>
               <a:rPr lang="en-US" sz="1600" dirty="0">
                 <a:solidFill>
@@ -3714,11 +3734,21 @@
                 <a:latin typeface="+mn-lt"/>
                 <a:cs typeface="+mn-cs"/>
               </a:rPr>
-              <a:t>Claudio Gomes, Aarhus University</a:t>
+              <a:t>, Aarhus University</a:t>
             </a:r>
           </a:p>
           <a:p>
             <a:pPr algn="ctr"/>
+            <a:r>
+              <a:rPr lang="en-US" sz="1600" u="sng" dirty="0">
+                <a:solidFill>
+                  <a:srgbClr val="5E676E"/>
+                </a:solidFill>
+                <a:latin typeface="+mn-lt"/>
+                <a:cs typeface="+mn-cs"/>
+              </a:rPr>
+              <a:t>Maurizio Palmieri</a:t>
+            </a:r>
             <a:r>
               <a:rPr lang="en-US" sz="1600" dirty="0">
                 <a:solidFill>
@@ -3727,7 +3757,7 @@
                 <a:latin typeface="+mn-lt"/>
                 <a:cs typeface="+mn-cs"/>
               </a:rPr>
-              <a:t>Maurizio Palmieri, University of Pisa</a:t>
+              <a:t>, University of Pisa</a:t>
             </a:r>
           </a:p>
           <a:p>
@@ -3857,7 +3887,7 @@
         <p:spPr>
           <a:xfrm>
             <a:off x="9619757" y="5961260"/>
-            <a:ext cx="4823460" cy="738664"/>
+            <a:ext cx="2077529" cy="461665"/>
           </a:xfrm>
           <a:prstGeom prst="rect">
             <a:avLst/>
@@ -3879,38 +3909,18 @@
                 <a:cs typeface="+mn-cs"/>
                 <a:hlinkClick r:id="rId5"/>
               </a:rPr>
-              <a:t>https://github.com/modelica/</a:t>
-            </a:r>
-            <a:br>
+              <a:t>https://github.com/modelica/fmi-beginners-tutorial-2024</a:t>
+            </a:r>
+            <a:r>
               <a:rPr lang="en-US" sz="1200" dirty="0">
                 <a:solidFill>
                   <a:srgbClr val="5E676E"/>
                 </a:solidFill>
                 <a:latin typeface="+mn-lt"/>
                 <a:cs typeface="+mn-cs"/>
-                <a:hlinkClick r:id="rId5"/>
               </a:rPr>
-            </a:br>
-            <a:r>
-              <a:rPr lang="en-US" sz="1200" dirty="0">
-                <a:solidFill>
-                  <a:srgbClr val="5E676E"/>
-                </a:solidFill>
-                <a:latin typeface="+mn-lt"/>
-                <a:cs typeface="+mn-cs"/>
-                <a:hlinkClick r:id="rId5"/>
-              </a:rPr>
-              <a:t>fmi-beginners-tutorial-2023/tree/main</a:t>
-            </a:r>
-            <a:endParaRPr lang="en-US" sz="1200" dirty="0">
-              <a:solidFill>
-                <a:srgbClr val="5E676E"/>
-              </a:solidFill>
-              <a:latin typeface="+mn-lt"/>
-              <a:cs typeface="+mn-cs"/>
-            </a:endParaRPr>
-          </a:p>
-          <a:p>
+              <a:t> </a:t>
+            </a:r>
             <a:endParaRPr lang="en-US" sz="1800" dirty="0">
               <a:solidFill>
                 <a:srgbClr val="5E676E"/>
@@ -20399,12 +20409,6 @@
 </file>
 
 <file path=customXml/item1.xml><?xml version="1.0" encoding="utf-8"?>
-<p:properties xmlns:p="http://schemas.microsoft.com/office/2006/metadata/properties" xmlns:xsi="http://www.w3.org/2001/XMLSchema-instance" xmlns:pc="http://schemas.microsoft.com/office/infopath/2007/PartnerControls">
-  <documentManagement/>
-</p:properties>
-</file>
-
-<file path=customXml/item2.xml><?xml version="1.0" encoding="utf-8"?>
 <ct:contentTypeSchema xmlns:ct="http://schemas.microsoft.com/office/2006/metadata/contentType" xmlns:ma="http://schemas.microsoft.com/office/2006/metadata/properties/metaAttributes" ct:_="" ma:_="" ma:contentTypeName="Document" ma:contentTypeID="0x0101004E5FCAD8E6222F478CF98AE6458717E4" ma:contentTypeVersion="0" ma:contentTypeDescription="Create a new document." ma:contentTypeScope="" ma:versionID="ae4c969974cdc097ec4092e4953e579e">
   <xsd:schema xmlns:xsd="http://www.w3.org/2001/XMLSchema" xmlns:p="http://schemas.microsoft.com/office/2006/metadata/properties" targetNamespace="http://schemas.microsoft.com/office/2006/metadata/properties" ma:root="true" ma:fieldsID="9684e7e44b4b32ae9d4fdaa413507a5d">
     <xsd:element name="properties">
@@ -20453,7 +20457,28 @@
 </ct:contentTypeSchema>
 </file>
 
+<file path=customXml/item2.xml><?xml version="1.0" encoding="utf-8"?>
+<p:properties xmlns:p="http://schemas.microsoft.com/office/2006/metadata/properties" xmlns:xsi="http://www.w3.org/2001/XMLSchema-instance" xmlns:pc="http://schemas.microsoft.com/office/infopath/2007/PartnerControls">
+  <documentManagement/>
+</p:properties>
+</file>
+
 <file path=customXml/itemProps1.xml><?xml version="1.0" encoding="utf-8"?>
+<ds:datastoreItem xmlns:ds="http://schemas.openxmlformats.org/officeDocument/2006/customXml" ds:itemID="{D6DDF4F8-48B7-40A7-A044-30F13F7F87CD}">
+  <ds:schemaRefs>
+    <ds:schemaRef ds:uri="http://schemas.microsoft.com/office/2006/metadata/contentType"/>
+    <ds:schemaRef ds:uri="http://schemas.microsoft.com/office/2006/metadata/properties/metaAttributes"/>
+    <ds:schemaRef ds:uri="http://www.w3.org/2001/XMLSchema"/>
+    <ds:schemaRef ds:uri="http://schemas.microsoft.com/office/2006/metadata/properties"/>
+    <ds:schemaRef ds:uri="http://schemas.openxmlformats.org/package/2006/metadata/core-properties"/>
+    <ds:schemaRef ds:uri="http://purl.org/dc/elements/1.1/"/>
+    <ds:schemaRef ds:uri="http://purl.org/dc/terms/"/>
+    <ds:schemaRef ds:uri="http://schemas.microsoft.com/office/internal/2005/internalDocumentation"/>
+  </ds:schemaRefs>
+</ds:datastoreItem>
+</file>
+
+<file path=customXml/itemProps2.xml><?xml version="1.0" encoding="utf-8"?>
 <ds:datastoreItem xmlns:ds="http://schemas.openxmlformats.org/officeDocument/2006/customXml" ds:itemID="{2605D1E8-C791-4C95-A083-CBF3AF871BEC}">
   <ds:schemaRefs>
     <ds:schemaRef ds:uri="http://purl.org/dc/terms/"/>
@@ -20466,19 +20491,4 @@
     <ds:schemaRef ds:uri="http://schemas.microsoft.com/office/infopath/2007/PartnerControls"/>
   </ds:schemaRefs>
 </ds:datastoreItem>
-</file>
-
-<file path=customXml/itemProps2.xml><?xml version="1.0" encoding="utf-8"?>
-<ds:datastoreItem xmlns:ds="http://schemas.openxmlformats.org/officeDocument/2006/customXml" ds:itemID="{D6DDF4F8-48B7-40A7-A044-30F13F7F87CD}">
-  <ds:schemaRefs>
-    <ds:schemaRef ds:uri="http://schemas.microsoft.com/office/2006/metadata/contentType"/>
-    <ds:schemaRef ds:uri="http://schemas.microsoft.com/office/2006/metadata/properties/metaAttributes"/>
-    <ds:schemaRef ds:uri="http://www.w3.org/2001/XMLSchema"/>
-    <ds:schemaRef ds:uri="http://schemas.microsoft.com/office/2006/metadata/properties"/>
-    <ds:schemaRef ds:uri="http://schemas.openxmlformats.org/package/2006/metadata/core-properties"/>
-    <ds:schemaRef ds:uri="http://purl.org/dc/elements/1.1/"/>
-    <ds:schemaRef ds:uri="http://purl.org/dc/terms/"/>
-    <ds:schemaRef ds:uri="http://schemas.microsoft.com/office/internal/2005/internalDocumentation"/>
-  </ds:schemaRefs>
-</ds:datastoreItem>
 </file>
</xml_diff>